<commit_message>
Write up draft 1
</commit_message>
<xml_diff>
--- a/Delayed Differential Equations.pptx
+++ b/Delayed Differential Equations.pptx
@@ -6201,6 +6201,465 @@
       <dsp:cNvGrpSpPr/>
     </dsp:nvGrpSpPr>
     <dsp:grpSpPr/>
+    <dsp:sp modelId="{673D75F0-A42F-4594-9B4B-06E694C25586}">
+      <dsp:nvSpPr>
+        <dsp:cNvPr id="0" name=""/>
+        <dsp:cNvSpPr/>
+      </dsp:nvSpPr>
+      <dsp:spPr>
+        <a:xfrm>
+          <a:off x="2575189" y="3466207"/>
+          <a:ext cx="3839469" cy="2370083"/>
+        </a:xfrm>
+        <a:prstGeom prst="rect">
+          <a:avLst/>
+        </a:prstGeom>
+        <a:blipFill>
+          <a:blip xmlns:r="http://schemas.openxmlformats.org/officeDocument/2006/relationships" r:embed="rId1">
+            <a:extLst>
+              <a:ext uri="{28A0092B-C50C-407E-A947-70E740481C1C}">
+                <a14:useLocalDpi xmlns:a14="http://schemas.microsoft.com/office/drawing/2010/main" val="0"/>
+              </a:ext>
+            </a:extLst>
+          </a:blip>
+          <a:srcRect/>
+          <a:stretch>
+            <a:fillRect t="-1000" b="-1000"/>
+          </a:stretch>
+        </a:blipFill>
+        <a:ln w="15875" cap="flat" cmpd="sng" algn="ctr">
+          <a:solidFill>
+            <a:schemeClr val="lt1">
+              <a:hueOff val="0"/>
+              <a:satOff val="0"/>
+              <a:lumOff val="0"/>
+              <a:alphaOff val="0"/>
+            </a:schemeClr>
+          </a:solidFill>
+          <a:prstDash val="solid"/>
+        </a:ln>
+        <a:effectLst/>
+      </dsp:spPr>
+      <dsp:style>
+        <a:lnRef idx="2">
+          <a:scrgbClr r="0" g="0" b="0"/>
+        </a:lnRef>
+        <a:fillRef idx="1">
+          <a:scrgbClr r="0" g="0" b="0"/>
+        </a:fillRef>
+        <a:effectRef idx="0">
+          <a:scrgbClr r="0" g="0" b="0"/>
+        </a:effectRef>
+        <a:fontRef idx="minor"/>
+      </dsp:style>
+    </dsp:sp>
+    <dsp:sp modelId="{414E6D62-2E28-46B6-B7D4-4B8BBBE34C42}">
+      <dsp:nvSpPr>
+        <dsp:cNvPr id="0" name=""/>
+        <dsp:cNvSpPr/>
+      </dsp:nvSpPr>
+      <dsp:spPr>
+        <a:xfrm>
+          <a:off x="4850982" y="280399"/>
+          <a:ext cx="3839469" cy="2370083"/>
+        </a:xfrm>
+        <a:prstGeom prst="rect">
+          <a:avLst/>
+        </a:prstGeom>
+        <a:blipFill>
+          <a:blip xmlns:r="http://schemas.openxmlformats.org/officeDocument/2006/relationships" r:embed="rId2">
+            <a:extLst>
+              <a:ext uri="{28A0092B-C50C-407E-A947-70E740481C1C}">
+                <a14:useLocalDpi xmlns:a14="http://schemas.microsoft.com/office/drawing/2010/main" val="0"/>
+              </a:ext>
+            </a:extLst>
+          </a:blip>
+          <a:srcRect/>
+          <a:stretch>
+            <a:fillRect t="-9000" b="-9000"/>
+          </a:stretch>
+        </a:blipFill>
+        <a:ln w="15875" cap="flat" cmpd="sng" algn="ctr">
+          <a:solidFill>
+            <a:schemeClr val="lt1">
+              <a:hueOff val="0"/>
+              <a:satOff val="0"/>
+              <a:lumOff val="0"/>
+              <a:alphaOff val="0"/>
+            </a:schemeClr>
+          </a:solidFill>
+          <a:prstDash val="solid"/>
+        </a:ln>
+        <a:effectLst/>
+      </dsp:spPr>
+      <dsp:style>
+        <a:lnRef idx="2">
+          <a:scrgbClr r="0" g="0" b="0"/>
+        </a:lnRef>
+        <a:fillRef idx="1">
+          <a:scrgbClr r="0" g="0" b="0"/>
+        </a:fillRef>
+        <a:effectRef idx="0">
+          <a:scrgbClr r="0" g="0" b="0"/>
+        </a:effectRef>
+        <a:fontRef idx="minor"/>
+      </dsp:style>
+    </dsp:sp>
+    <dsp:sp modelId="{2618C4BE-B6E6-4DD4-8258-0A81CA05DF13}">
+      <dsp:nvSpPr>
+        <dsp:cNvPr id="0" name=""/>
+        <dsp:cNvSpPr/>
+      </dsp:nvSpPr>
+      <dsp:spPr>
+        <a:xfrm>
+          <a:off x="299396" y="280399"/>
+          <a:ext cx="3839469" cy="2370083"/>
+        </a:xfrm>
+        <a:prstGeom prst="rect">
+          <a:avLst/>
+        </a:prstGeom>
+        <a:blipFill>
+          <a:blip xmlns:r="http://schemas.openxmlformats.org/officeDocument/2006/relationships" r:embed="rId3">
+            <a:extLst>
+              <a:ext uri="{28A0092B-C50C-407E-A947-70E740481C1C}">
+                <a14:useLocalDpi xmlns:a14="http://schemas.microsoft.com/office/drawing/2010/main" val="0"/>
+              </a:ext>
+            </a:extLst>
+          </a:blip>
+          <a:srcRect/>
+          <a:stretch>
+            <a:fillRect t="-11000" b="-11000"/>
+          </a:stretch>
+        </a:blipFill>
+        <a:ln w="15875" cap="flat" cmpd="sng" algn="ctr">
+          <a:solidFill>
+            <a:schemeClr val="lt1">
+              <a:hueOff val="0"/>
+              <a:satOff val="0"/>
+              <a:lumOff val="0"/>
+              <a:alphaOff val="0"/>
+            </a:schemeClr>
+          </a:solidFill>
+          <a:prstDash val="solid"/>
+        </a:ln>
+        <a:effectLst/>
+      </dsp:spPr>
+      <dsp:style>
+        <a:lnRef idx="2">
+          <a:scrgbClr r="0" g="0" b="0"/>
+        </a:lnRef>
+        <a:fillRef idx="1">
+          <a:scrgbClr r="0" g="0" b="0"/>
+        </a:fillRef>
+        <a:effectRef idx="0">
+          <a:scrgbClr r="0" g="0" b="0"/>
+        </a:effectRef>
+        <a:fontRef idx="minor"/>
+      </dsp:style>
+    </dsp:sp>
+    <dsp:sp modelId="{4405F914-9D40-4FE8-A903-D126E72F12C7}">
+      <dsp:nvSpPr>
+        <dsp:cNvPr id="0" name=""/>
+        <dsp:cNvSpPr/>
+      </dsp:nvSpPr>
+      <dsp:spPr>
+        <a:xfrm>
+          <a:off x="1060" y="2636623"/>
+          <a:ext cx="3831607" cy="405547"/>
+        </a:xfrm>
+        <a:prstGeom prst="rect">
+          <a:avLst/>
+        </a:prstGeom>
+        <a:noFill/>
+        <a:ln>
+          <a:noFill/>
+        </a:ln>
+        <a:effectLst/>
+      </dsp:spPr>
+      <dsp:style>
+        <a:lnRef idx="0">
+          <a:scrgbClr r="0" g="0" b="0"/>
+        </a:lnRef>
+        <a:fillRef idx="0">
+          <a:scrgbClr r="0" g="0" b="0"/>
+        </a:fillRef>
+        <a:effectRef idx="0">
+          <a:scrgbClr r="0" g="0" b="0"/>
+        </a:effectRef>
+        <a:fontRef idx="minor"/>
+      </dsp:style>
+      <dsp:txBody>
+        <a:bodyPr spcFirstLastPara="0" vert="horz" wrap="square" lIns="121920" tIns="0" rIns="121920" bIns="0" numCol="1" spcCol="1270" anchor="b" anchorCtr="0">
+          <a:noAutofit/>
+        </a:bodyPr>
+        <a:lstStyle/>
+        <a:p>
+          <a:pPr lvl="0" algn="l" defTabSz="1422400">
+            <a:lnSpc>
+              <a:spcPct val="90000"/>
+            </a:lnSpc>
+            <a:spcBef>
+              <a:spcPct val="0"/>
+            </a:spcBef>
+            <a:spcAft>
+              <a:spcPct val="35000"/>
+            </a:spcAft>
+          </a:pPr>
+          <a:r>
+            <a:rPr lang="en-US" sz="3200" kern="1200" dirty="0" smtClean="0"/>
+            <a:t>Sinusoidal input</a:t>
+          </a:r>
+          <a:endParaRPr lang="en-US" sz="3200" kern="1200" dirty="0"/>
+        </a:p>
+      </dsp:txBody>
+      <dsp:txXfrm>
+        <a:off x="1060" y="2636623"/>
+        <a:ext cx="3831607" cy="405547"/>
+      </dsp:txXfrm>
+    </dsp:sp>
+    <dsp:sp modelId="{B94A3508-6EE1-4F84-BA2D-88D72D33E1F7}">
+      <dsp:nvSpPr>
+        <dsp:cNvPr id="0" name=""/>
+        <dsp:cNvSpPr/>
+      </dsp:nvSpPr>
+      <dsp:spPr>
+        <a:xfrm>
+          <a:off x="1060" y="586431"/>
+          <a:ext cx="3838228" cy="2465995"/>
+        </a:xfrm>
+        <a:prstGeom prst="rect">
+          <a:avLst/>
+        </a:prstGeom>
+        <a:noFill/>
+        <a:ln w="15875" cap="flat" cmpd="sng" algn="ctr">
+          <a:solidFill>
+            <a:schemeClr val="accent1">
+              <a:shade val="60000"/>
+              <a:hueOff val="0"/>
+              <a:satOff val="0"/>
+              <a:lumOff val="0"/>
+              <a:alphaOff val="0"/>
+            </a:schemeClr>
+          </a:solidFill>
+          <a:prstDash val="solid"/>
+        </a:ln>
+        <a:effectLst/>
+      </dsp:spPr>
+      <dsp:style>
+        <a:lnRef idx="2">
+          <a:scrgbClr r="0" g="0" b="0"/>
+        </a:lnRef>
+        <a:fillRef idx="0">
+          <a:scrgbClr r="0" g="0" b="0"/>
+        </a:fillRef>
+        <a:effectRef idx="0">
+          <a:scrgbClr r="0" g="0" b="0"/>
+        </a:effectRef>
+        <a:fontRef idx="minor"/>
+      </dsp:style>
+    </dsp:sp>
+    <dsp:sp modelId="{4E05E67A-E078-4AFB-B323-BC0480CC6FB7}">
+      <dsp:nvSpPr>
+        <dsp:cNvPr id="0" name=""/>
+        <dsp:cNvSpPr/>
+      </dsp:nvSpPr>
+      <dsp:spPr>
+        <a:xfrm>
+          <a:off x="4552646" y="2636623"/>
+          <a:ext cx="3831607" cy="405547"/>
+        </a:xfrm>
+        <a:prstGeom prst="rect">
+          <a:avLst/>
+        </a:prstGeom>
+        <a:noFill/>
+        <a:ln>
+          <a:noFill/>
+        </a:ln>
+        <a:effectLst/>
+      </dsp:spPr>
+      <dsp:style>
+        <a:lnRef idx="0">
+          <a:scrgbClr r="0" g="0" b="0"/>
+        </a:lnRef>
+        <a:fillRef idx="0">
+          <a:scrgbClr r="0" g="0" b="0"/>
+        </a:fillRef>
+        <a:effectRef idx="0">
+          <a:scrgbClr r="0" g="0" b="0"/>
+        </a:effectRef>
+        <a:fontRef idx="minor"/>
+      </dsp:style>
+      <dsp:txBody>
+        <a:bodyPr spcFirstLastPara="0" vert="horz" wrap="square" lIns="121920" tIns="0" rIns="121920" bIns="0" numCol="1" spcCol="1270" anchor="b" anchorCtr="0">
+          <a:noAutofit/>
+        </a:bodyPr>
+        <a:lstStyle/>
+        <a:p>
+          <a:pPr lvl="0" algn="l" defTabSz="1422400">
+            <a:lnSpc>
+              <a:spcPct val="90000"/>
+            </a:lnSpc>
+            <a:spcBef>
+              <a:spcPct val="0"/>
+            </a:spcBef>
+            <a:spcAft>
+              <a:spcPct val="35000"/>
+            </a:spcAft>
+          </a:pPr>
+          <a:r>
+            <a:rPr lang="en-US" sz="3200" kern="1200" dirty="0" smtClean="0"/>
+            <a:t>Sinusoidal history</a:t>
+          </a:r>
+          <a:endParaRPr lang="en-US" sz="3200" kern="1200" dirty="0"/>
+        </a:p>
+      </dsp:txBody>
+      <dsp:txXfrm>
+        <a:off x="4552646" y="2636623"/>
+        <a:ext cx="3831607" cy="405547"/>
+      </dsp:txXfrm>
+    </dsp:sp>
+    <dsp:sp modelId="{B1A6DB5A-3DA5-4A52-94AB-ACCD48881AEB}">
+      <dsp:nvSpPr>
+        <dsp:cNvPr id="0" name=""/>
+        <dsp:cNvSpPr/>
+      </dsp:nvSpPr>
+      <dsp:spPr>
+        <a:xfrm>
+          <a:off x="4552646" y="586431"/>
+          <a:ext cx="3838228" cy="2465995"/>
+        </a:xfrm>
+        <a:prstGeom prst="rect">
+          <a:avLst/>
+        </a:prstGeom>
+        <a:noFill/>
+        <a:ln w="15875" cap="flat" cmpd="sng" algn="ctr">
+          <a:solidFill>
+            <a:schemeClr val="accent1">
+              <a:shade val="60000"/>
+              <a:hueOff val="0"/>
+              <a:satOff val="0"/>
+              <a:lumOff val="0"/>
+              <a:alphaOff val="0"/>
+            </a:schemeClr>
+          </a:solidFill>
+          <a:prstDash val="solid"/>
+        </a:ln>
+        <a:effectLst/>
+      </dsp:spPr>
+      <dsp:style>
+        <a:lnRef idx="2">
+          <a:scrgbClr r="0" g="0" b="0"/>
+        </a:lnRef>
+        <a:fillRef idx="0">
+          <a:scrgbClr r="0" g="0" b="0"/>
+        </a:fillRef>
+        <a:effectRef idx="0">
+          <a:scrgbClr r="0" g="0" b="0"/>
+        </a:effectRef>
+        <a:fontRef idx="minor"/>
+      </dsp:style>
+    </dsp:sp>
+    <dsp:sp modelId="{B96A84FB-0136-489A-A1AF-B53F1D122976}">
+      <dsp:nvSpPr>
+        <dsp:cNvPr id="0" name=""/>
+        <dsp:cNvSpPr/>
+      </dsp:nvSpPr>
+      <dsp:spPr>
+        <a:xfrm>
+          <a:off x="2276853" y="5822431"/>
+          <a:ext cx="3831607" cy="405547"/>
+        </a:xfrm>
+        <a:prstGeom prst="rect">
+          <a:avLst/>
+        </a:prstGeom>
+        <a:noFill/>
+        <a:ln>
+          <a:noFill/>
+        </a:ln>
+        <a:effectLst/>
+      </dsp:spPr>
+      <dsp:style>
+        <a:lnRef idx="0">
+          <a:scrgbClr r="0" g="0" b="0"/>
+        </a:lnRef>
+        <a:fillRef idx="0">
+          <a:scrgbClr r="0" g="0" b="0"/>
+        </a:fillRef>
+        <a:effectRef idx="0">
+          <a:scrgbClr r="0" g="0" b="0"/>
+        </a:effectRef>
+        <a:fontRef idx="minor"/>
+      </dsp:style>
+      <dsp:txBody>
+        <a:bodyPr spcFirstLastPara="0" vert="horz" wrap="square" lIns="121920" tIns="0" rIns="121920" bIns="0" numCol="1" spcCol="1270" anchor="b" anchorCtr="0">
+          <a:noAutofit/>
+        </a:bodyPr>
+        <a:lstStyle/>
+        <a:p>
+          <a:pPr lvl="0" algn="l" defTabSz="1422400">
+            <a:lnSpc>
+              <a:spcPct val="90000"/>
+            </a:lnSpc>
+            <a:spcBef>
+              <a:spcPct val="0"/>
+            </a:spcBef>
+            <a:spcAft>
+              <a:spcPct val="35000"/>
+            </a:spcAft>
+          </a:pPr>
+          <a:r>
+            <a:rPr lang="en-US" sz="3200" kern="1200" dirty="0" smtClean="0"/>
+            <a:t>Default</a:t>
+          </a:r>
+          <a:endParaRPr lang="en-US" sz="3200" kern="1200" dirty="0"/>
+        </a:p>
+      </dsp:txBody>
+      <dsp:txXfrm>
+        <a:off x="2276853" y="5822431"/>
+        <a:ext cx="3831607" cy="405547"/>
+      </dsp:txXfrm>
+    </dsp:sp>
+    <dsp:sp modelId="{A925C7AA-2651-492D-8EC9-97881AAC5AD4}">
+      <dsp:nvSpPr>
+        <dsp:cNvPr id="0" name=""/>
+        <dsp:cNvSpPr/>
+      </dsp:nvSpPr>
+      <dsp:spPr>
+        <a:xfrm>
+          <a:off x="2276853" y="3772239"/>
+          <a:ext cx="3838228" cy="2465995"/>
+        </a:xfrm>
+        <a:prstGeom prst="rect">
+          <a:avLst/>
+        </a:prstGeom>
+        <a:noFill/>
+        <a:ln w="15875" cap="flat" cmpd="sng" algn="ctr">
+          <a:solidFill>
+            <a:schemeClr val="accent1">
+              <a:shade val="60000"/>
+              <a:hueOff val="0"/>
+              <a:satOff val="0"/>
+              <a:lumOff val="0"/>
+              <a:alphaOff val="0"/>
+            </a:schemeClr>
+          </a:solidFill>
+          <a:prstDash val="solid"/>
+        </a:ln>
+        <a:effectLst/>
+      </dsp:spPr>
+      <dsp:style>
+        <a:lnRef idx="2">
+          <a:scrgbClr r="0" g="0" b="0"/>
+        </a:lnRef>
+        <a:fillRef idx="0">
+          <a:scrgbClr r="0" g="0" b="0"/>
+        </a:fillRef>
+        <a:effectRef idx="0">
+          <a:scrgbClr r="0" g="0" b="0"/>
+        </a:effectRef>
+        <a:fontRef idx="minor"/>
+      </dsp:style>
+    </dsp:sp>
   </dsp:spTree>
 </dsp:drawing>
 </file>
@@ -6213,6 +6672,611 @@
       <dsp:cNvGrpSpPr/>
     </dsp:nvGrpSpPr>
     <dsp:grpSpPr/>
+    <dsp:sp modelId="{67D12C54-D24E-4B7E-9F2C-2A7DFEF5DFB3}">
+      <dsp:nvSpPr>
+        <dsp:cNvPr id="0" name=""/>
+        <dsp:cNvSpPr/>
+      </dsp:nvSpPr>
+      <dsp:spPr>
+        <a:xfrm>
+          <a:off x="4850982" y="3466207"/>
+          <a:ext cx="3839469" cy="2370083"/>
+        </a:xfrm>
+        <a:prstGeom prst="rect">
+          <a:avLst/>
+        </a:prstGeom>
+        <a:blipFill>
+          <a:blip xmlns:r="http://schemas.openxmlformats.org/officeDocument/2006/relationships" r:embed="rId1">
+            <a:extLst>
+              <a:ext uri="{28A0092B-C50C-407E-A947-70E740481C1C}">
+                <a14:useLocalDpi xmlns:a14="http://schemas.microsoft.com/office/drawing/2010/main" val="0"/>
+              </a:ext>
+            </a:extLst>
+          </a:blip>
+          <a:srcRect/>
+          <a:stretch>
+            <a:fillRect t="-11000" b="-11000"/>
+          </a:stretch>
+        </a:blipFill>
+        <a:ln w="15875" cap="flat" cmpd="sng" algn="ctr">
+          <a:solidFill>
+            <a:schemeClr val="lt1">
+              <a:hueOff val="0"/>
+              <a:satOff val="0"/>
+              <a:lumOff val="0"/>
+              <a:alphaOff val="0"/>
+            </a:schemeClr>
+          </a:solidFill>
+          <a:prstDash val="solid"/>
+        </a:ln>
+        <a:effectLst/>
+      </dsp:spPr>
+      <dsp:style>
+        <a:lnRef idx="2">
+          <a:scrgbClr r="0" g="0" b="0"/>
+        </a:lnRef>
+        <a:fillRef idx="1">
+          <a:scrgbClr r="0" g="0" b="0"/>
+        </a:fillRef>
+        <a:effectRef idx="0">
+          <a:scrgbClr r="0" g="0" b="0"/>
+        </a:effectRef>
+        <a:fontRef idx="minor"/>
+      </dsp:style>
+    </dsp:sp>
+    <dsp:sp modelId="{673D75F0-A42F-4594-9B4B-06E694C25586}">
+      <dsp:nvSpPr>
+        <dsp:cNvPr id="0" name=""/>
+        <dsp:cNvSpPr/>
+      </dsp:nvSpPr>
+      <dsp:spPr>
+        <a:xfrm>
+          <a:off x="299396" y="3466207"/>
+          <a:ext cx="3839469" cy="2370083"/>
+        </a:xfrm>
+        <a:prstGeom prst="rect">
+          <a:avLst/>
+        </a:prstGeom>
+        <a:blipFill rotWithShape="1">
+          <a:blip xmlns:r="http://schemas.openxmlformats.org/officeDocument/2006/relationships" r:embed="rId2"/>
+          <a:stretch>
+            <a:fillRect/>
+          </a:stretch>
+        </a:blipFill>
+        <a:ln w="15875" cap="flat" cmpd="sng" algn="ctr">
+          <a:solidFill>
+            <a:schemeClr val="lt1">
+              <a:hueOff val="0"/>
+              <a:satOff val="0"/>
+              <a:lumOff val="0"/>
+              <a:alphaOff val="0"/>
+            </a:schemeClr>
+          </a:solidFill>
+          <a:prstDash val="solid"/>
+        </a:ln>
+        <a:effectLst/>
+      </dsp:spPr>
+      <dsp:style>
+        <a:lnRef idx="2">
+          <a:scrgbClr r="0" g="0" b="0"/>
+        </a:lnRef>
+        <a:fillRef idx="1">
+          <a:scrgbClr r="0" g="0" b="0"/>
+        </a:fillRef>
+        <a:effectRef idx="0">
+          <a:scrgbClr r="0" g="0" b="0"/>
+        </a:effectRef>
+        <a:fontRef idx="minor"/>
+      </dsp:style>
+    </dsp:sp>
+    <dsp:sp modelId="{414E6D62-2E28-46B6-B7D4-4B8BBBE34C42}">
+      <dsp:nvSpPr>
+        <dsp:cNvPr id="0" name=""/>
+        <dsp:cNvSpPr/>
+      </dsp:nvSpPr>
+      <dsp:spPr>
+        <a:xfrm>
+          <a:off x="4850982" y="280399"/>
+          <a:ext cx="3839469" cy="2370083"/>
+        </a:xfrm>
+        <a:prstGeom prst="rect">
+          <a:avLst/>
+        </a:prstGeom>
+        <a:blipFill>
+          <a:blip xmlns:r="http://schemas.openxmlformats.org/officeDocument/2006/relationships" r:embed="rId3">
+            <a:extLst>
+              <a:ext uri="{28A0092B-C50C-407E-A947-70E740481C1C}">
+                <a14:useLocalDpi xmlns:a14="http://schemas.microsoft.com/office/drawing/2010/main" val="0"/>
+              </a:ext>
+            </a:extLst>
+          </a:blip>
+          <a:srcRect/>
+          <a:stretch>
+            <a:fillRect t="-10000" b="-10000"/>
+          </a:stretch>
+        </a:blipFill>
+        <a:ln w="15875" cap="flat" cmpd="sng" algn="ctr">
+          <a:solidFill>
+            <a:schemeClr val="lt1">
+              <a:hueOff val="0"/>
+              <a:satOff val="0"/>
+              <a:lumOff val="0"/>
+              <a:alphaOff val="0"/>
+            </a:schemeClr>
+          </a:solidFill>
+          <a:prstDash val="solid"/>
+        </a:ln>
+        <a:effectLst/>
+      </dsp:spPr>
+      <dsp:style>
+        <a:lnRef idx="2">
+          <a:scrgbClr r="0" g="0" b="0"/>
+        </a:lnRef>
+        <a:fillRef idx="1">
+          <a:scrgbClr r="0" g="0" b="0"/>
+        </a:fillRef>
+        <a:effectRef idx="0">
+          <a:scrgbClr r="0" g="0" b="0"/>
+        </a:effectRef>
+        <a:fontRef idx="minor"/>
+      </dsp:style>
+    </dsp:sp>
+    <dsp:sp modelId="{2618C4BE-B6E6-4DD4-8258-0A81CA05DF13}">
+      <dsp:nvSpPr>
+        <dsp:cNvPr id="0" name=""/>
+        <dsp:cNvSpPr/>
+      </dsp:nvSpPr>
+      <dsp:spPr>
+        <a:xfrm>
+          <a:off x="299396" y="280399"/>
+          <a:ext cx="3839469" cy="2370083"/>
+        </a:xfrm>
+        <a:prstGeom prst="rect">
+          <a:avLst/>
+        </a:prstGeom>
+        <a:blipFill>
+          <a:blip xmlns:r="http://schemas.openxmlformats.org/officeDocument/2006/relationships" r:embed="rId4">
+            <a:extLst>
+              <a:ext uri="{28A0092B-C50C-407E-A947-70E740481C1C}">
+                <a14:useLocalDpi xmlns:a14="http://schemas.microsoft.com/office/drawing/2010/main" val="0"/>
+              </a:ext>
+            </a:extLst>
+          </a:blip>
+          <a:srcRect/>
+          <a:stretch>
+            <a:fillRect t="-11000" b="-11000"/>
+          </a:stretch>
+        </a:blipFill>
+        <a:ln w="15875" cap="flat" cmpd="sng" algn="ctr">
+          <a:solidFill>
+            <a:schemeClr val="lt1">
+              <a:hueOff val="0"/>
+              <a:satOff val="0"/>
+              <a:lumOff val="0"/>
+              <a:alphaOff val="0"/>
+            </a:schemeClr>
+          </a:solidFill>
+          <a:prstDash val="solid"/>
+        </a:ln>
+        <a:effectLst/>
+      </dsp:spPr>
+      <dsp:style>
+        <a:lnRef idx="2">
+          <a:scrgbClr r="0" g="0" b="0"/>
+        </a:lnRef>
+        <a:fillRef idx="1">
+          <a:scrgbClr r="0" g="0" b="0"/>
+        </a:fillRef>
+        <a:effectRef idx="0">
+          <a:scrgbClr r="0" g="0" b="0"/>
+        </a:effectRef>
+        <a:fontRef idx="minor"/>
+      </dsp:style>
+    </dsp:sp>
+    <dsp:sp modelId="{4405F914-9D40-4FE8-A903-D126E72F12C7}">
+      <dsp:nvSpPr>
+        <dsp:cNvPr id="0" name=""/>
+        <dsp:cNvSpPr/>
+      </dsp:nvSpPr>
+      <dsp:spPr>
+        <a:xfrm>
+          <a:off x="1060" y="2636623"/>
+          <a:ext cx="3831607" cy="405547"/>
+        </a:xfrm>
+        <a:prstGeom prst="rect">
+          <a:avLst/>
+        </a:prstGeom>
+        <a:noFill/>
+        <a:ln>
+          <a:noFill/>
+        </a:ln>
+        <a:effectLst/>
+      </dsp:spPr>
+      <dsp:style>
+        <a:lnRef idx="0">
+          <a:scrgbClr r="0" g="0" b="0"/>
+        </a:lnRef>
+        <a:fillRef idx="0">
+          <a:scrgbClr r="0" g="0" b="0"/>
+        </a:fillRef>
+        <a:effectRef idx="0">
+          <a:scrgbClr r="0" g="0" b="0"/>
+        </a:effectRef>
+        <a:fontRef idx="minor"/>
+      </dsp:style>
+      <dsp:txBody>
+        <a:bodyPr spcFirstLastPara="0" vert="horz" wrap="square" lIns="102870" tIns="0" rIns="102870" bIns="0" numCol="1" spcCol="1270" anchor="b" anchorCtr="0">
+          <a:noAutofit/>
+        </a:bodyPr>
+        <a:lstStyle/>
+        <a:p>
+          <a:pPr lvl="0" algn="l" defTabSz="1200150">
+            <a:lnSpc>
+              <a:spcPct val="90000"/>
+            </a:lnSpc>
+            <a:spcBef>
+              <a:spcPct val="0"/>
+            </a:spcBef>
+            <a:spcAft>
+              <a:spcPct val="35000"/>
+            </a:spcAft>
+          </a:pPr>
+          <a:r>
+            <a:rPr lang="en-US" sz="2700" kern="1200" dirty="0" smtClean="0"/>
+            <a:t>Queue Size Change Small	</a:t>
+          </a:r>
+          <a:endParaRPr lang="en-US" sz="2700" kern="1200" dirty="0"/>
+        </a:p>
+      </dsp:txBody>
+      <dsp:txXfrm>
+        <a:off x="1060" y="2636623"/>
+        <a:ext cx="3831607" cy="405547"/>
+      </dsp:txXfrm>
+    </dsp:sp>
+    <dsp:sp modelId="{B94A3508-6EE1-4F84-BA2D-88D72D33E1F7}">
+      <dsp:nvSpPr>
+        <dsp:cNvPr id="0" name=""/>
+        <dsp:cNvSpPr/>
+      </dsp:nvSpPr>
+      <dsp:spPr>
+        <a:xfrm>
+          <a:off x="1060" y="586431"/>
+          <a:ext cx="3838228" cy="2465995"/>
+        </a:xfrm>
+        <a:prstGeom prst="rect">
+          <a:avLst/>
+        </a:prstGeom>
+        <a:noFill/>
+        <a:ln w="15875" cap="flat" cmpd="sng" algn="ctr">
+          <a:solidFill>
+            <a:schemeClr val="accent1">
+              <a:shade val="60000"/>
+              <a:hueOff val="0"/>
+              <a:satOff val="0"/>
+              <a:lumOff val="0"/>
+              <a:alphaOff val="0"/>
+            </a:schemeClr>
+          </a:solidFill>
+          <a:prstDash val="solid"/>
+        </a:ln>
+        <a:effectLst/>
+      </dsp:spPr>
+      <dsp:style>
+        <a:lnRef idx="2">
+          <a:scrgbClr r="0" g="0" b="0"/>
+        </a:lnRef>
+        <a:fillRef idx="0">
+          <a:scrgbClr r="0" g="0" b="0"/>
+        </a:fillRef>
+        <a:effectRef idx="0">
+          <a:scrgbClr r="0" g="0" b="0"/>
+        </a:effectRef>
+        <a:fontRef idx="minor"/>
+      </dsp:style>
+    </dsp:sp>
+    <dsp:sp modelId="{4E05E67A-E078-4AFB-B323-BC0480CC6FB7}">
+      <dsp:nvSpPr>
+        <dsp:cNvPr id="0" name=""/>
+        <dsp:cNvSpPr/>
+      </dsp:nvSpPr>
+      <dsp:spPr>
+        <a:xfrm>
+          <a:off x="4552646" y="2636623"/>
+          <a:ext cx="3831607" cy="405547"/>
+        </a:xfrm>
+        <a:prstGeom prst="rect">
+          <a:avLst/>
+        </a:prstGeom>
+        <a:noFill/>
+        <a:ln>
+          <a:noFill/>
+        </a:ln>
+        <a:effectLst/>
+      </dsp:spPr>
+      <dsp:style>
+        <a:lnRef idx="0">
+          <a:scrgbClr r="0" g="0" b="0"/>
+        </a:lnRef>
+        <a:fillRef idx="0">
+          <a:scrgbClr r="0" g="0" b="0"/>
+        </a:fillRef>
+        <a:effectRef idx="0">
+          <a:scrgbClr r="0" g="0" b="0"/>
+        </a:effectRef>
+        <a:fontRef idx="minor"/>
+      </dsp:style>
+      <dsp:txBody>
+        <a:bodyPr spcFirstLastPara="0" vert="horz" wrap="square" lIns="102870" tIns="0" rIns="102870" bIns="0" numCol="1" spcCol="1270" anchor="b" anchorCtr="0">
+          <a:noAutofit/>
+        </a:bodyPr>
+        <a:lstStyle/>
+        <a:p>
+          <a:pPr lvl="0" algn="l" defTabSz="1200150">
+            <a:lnSpc>
+              <a:spcPct val="90000"/>
+            </a:lnSpc>
+            <a:spcBef>
+              <a:spcPct val="0"/>
+            </a:spcBef>
+            <a:spcAft>
+              <a:spcPct val="35000"/>
+            </a:spcAft>
+          </a:pPr>
+          <a:r>
+            <a:rPr lang="en-US" sz="2700" kern="1200" dirty="0" smtClean="0"/>
+            <a:t>Queue Size Change Big</a:t>
+          </a:r>
+          <a:endParaRPr lang="en-US" sz="2700" kern="1200" dirty="0"/>
+        </a:p>
+      </dsp:txBody>
+      <dsp:txXfrm>
+        <a:off x="4552646" y="2636623"/>
+        <a:ext cx="3831607" cy="405547"/>
+      </dsp:txXfrm>
+    </dsp:sp>
+    <dsp:sp modelId="{B1A6DB5A-3DA5-4A52-94AB-ACCD48881AEB}">
+      <dsp:nvSpPr>
+        <dsp:cNvPr id="0" name=""/>
+        <dsp:cNvSpPr/>
+      </dsp:nvSpPr>
+      <dsp:spPr>
+        <a:xfrm>
+          <a:off x="4552646" y="586431"/>
+          <a:ext cx="3838228" cy="2465995"/>
+        </a:xfrm>
+        <a:prstGeom prst="rect">
+          <a:avLst/>
+        </a:prstGeom>
+        <a:noFill/>
+        <a:ln w="15875" cap="flat" cmpd="sng" algn="ctr">
+          <a:solidFill>
+            <a:schemeClr val="accent1">
+              <a:shade val="60000"/>
+              <a:hueOff val="0"/>
+              <a:satOff val="0"/>
+              <a:lumOff val="0"/>
+              <a:alphaOff val="0"/>
+            </a:schemeClr>
+          </a:solidFill>
+          <a:prstDash val="solid"/>
+        </a:ln>
+        <a:effectLst/>
+      </dsp:spPr>
+      <dsp:style>
+        <a:lnRef idx="2">
+          <a:scrgbClr r="0" g="0" b="0"/>
+        </a:lnRef>
+        <a:fillRef idx="0">
+          <a:scrgbClr r="0" g="0" b="0"/>
+        </a:fillRef>
+        <a:effectRef idx="0">
+          <a:scrgbClr r="0" g="0" b="0"/>
+        </a:effectRef>
+        <a:fontRef idx="minor"/>
+      </dsp:style>
+    </dsp:sp>
+    <dsp:sp modelId="{B96A84FB-0136-489A-A1AF-B53F1D122976}">
+      <dsp:nvSpPr>
+        <dsp:cNvPr id="0" name=""/>
+        <dsp:cNvSpPr/>
+      </dsp:nvSpPr>
+      <dsp:spPr>
+        <a:xfrm>
+          <a:off x="1060" y="5822431"/>
+          <a:ext cx="3831607" cy="405547"/>
+        </a:xfrm>
+        <a:prstGeom prst="rect">
+          <a:avLst/>
+        </a:prstGeom>
+        <a:noFill/>
+        <a:ln>
+          <a:noFill/>
+        </a:ln>
+        <a:effectLst/>
+      </dsp:spPr>
+      <dsp:style>
+        <a:lnRef idx="0">
+          <a:scrgbClr r="0" g="0" b="0"/>
+        </a:lnRef>
+        <a:fillRef idx="0">
+          <a:scrgbClr r="0" g="0" b="0"/>
+        </a:fillRef>
+        <a:effectRef idx="0">
+          <a:scrgbClr r="0" g="0" b="0"/>
+        </a:effectRef>
+        <a:fontRef idx="minor"/>
+      </dsp:style>
+      <dsp:txBody>
+        <a:bodyPr spcFirstLastPara="0" vert="horz" wrap="square" lIns="102870" tIns="0" rIns="102870" bIns="0" numCol="1" spcCol="1270" anchor="b" anchorCtr="0">
+          <a:noAutofit/>
+        </a:bodyPr>
+        <a:lstStyle/>
+        <a:p>
+          <a:pPr lvl="0" algn="l" defTabSz="1200150">
+            <a:lnSpc>
+              <a:spcPct val="90000"/>
+            </a:lnSpc>
+            <a:spcBef>
+              <a:spcPct val="0"/>
+            </a:spcBef>
+            <a:spcAft>
+              <a:spcPct val="35000"/>
+            </a:spcAft>
+          </a:pPr>
+          <a:r>
+            <a:rPr lang="en-US" sz="2700" kern="1200" dirty="0" smtClean="0"/>
+            <a:t>Default</a:t>
+          </a:r>
+          <a:endParaRPr lang="en-US" sz="2700" kern="1200" dirty="0"/>
+        </a:p>
+      </dsp:txBody>
+      <dsp:txXfrm>
+        <a:off x="1060" y="5822431"/>
+        <a:ext cx="3831607" cy="405547"/>
+      </dsp:txXfrm>
+    </dsp:sp>
+    <dsp:sp modelId="{A925C7AA-2651-492D-8EC9-97881AAC5AD4}">
+      <dsp:nvSpPr>
+        <dsp:cNvPr id="0" name=""/>
+        <dsp:cNvSpPr/>
+      </dsp:nvSpPr>
+      <dsp:spPr>
+        <a:xfrm>
+          <a:off x="1060" y="3772239"/>
+          <a:ext cx="3838228" cy="2465995"/>
+        </a:xfrm>
+        <a:prstGeom prst="rect">
+          <a:avLst/>
+        </a:prstGeom>
+        <a:noFill/>
+        <a:ln w="15875" cap="flat" cmpd="sng" algn="ctr">
+          <a:solidFill>
+            <a:schemeClr val="accent1">
+              <a:shade val="60000"/>
+              <a:hueOff val="0"/>
+              <a:satOff val="0"/>
+              <a:lumOff val="0"/>
+              <a:alphaOff val="0"/>
+            </a:schemeClr>
+          </a:solidFill>
+          <a:prstDash val="solid"/>
+        </a:ln>
+        <a:effectLst/>
+      </dsp:spPr>
+      <dsp:style>
+        <a:lnRef idx="2">
+          <a:scrgbClr r="0" g="0" b="0"/>
+        </a:lnRef>
+        <a:fillRef idx="0">
+          <a:scrgbClr r="0" g="0" b="0"/>
+        </a:fillRef>
+        <a:effectRef idx="0">
+          <a:scrgbClr r="0" g="0" b="0"/>
+        </a:effectRef>
+        <a:fontRef idx="minor"/>
+      </dsp:style>
+    </dsp:sp>
+    <dsp:sp modelId="{FDBFB33F-41D1-4396-896C-B1A2BF090A42}">
+      <dsp:nvSpPr>
+        <dsp:cNvPr id="0" name=""/>
+        <dsp:cNvSpPr/>
+      </dsp:nvSpPr>
+      <dsp:spPr>
+        <a:xfrm>
+          <a:off x="4552646" y="5822431"/>
+          <a:ext cx="3831607" cy="405547"/>
+        </a:xfrm>
+        <a:prstGeom prst="rect">
+          <a:avLst/>
+        </a:prstGeom>
+        <a:noFill/>
+        <a:ln>
+          <a:noFill/>
+        </a:ln>
+        <a:effectLst/>
+      </dsp:spPr>
+      <dsp:style>
+        <a:lnRef idx="0">
+          <a:scrgbClr r="0" g="0" b="0"/>
+        </a:lnRef>
+        <a:fillRef idx="0">
+          <a:scrgbClr r="0" g="0" b="0"/>
+        </a:fillRef>
+        <a:effectRef idx="0">
+          <a:scrgbClr r="0" g="0" b="0"/>
+        </a:effectRef>
+        <a:fontRef idx="minor"/>
+      </dsp:style>
+      <dsp:txBody>
+        <a:bodyPr spcFirstLastPara="0" vert="horz" wrap="square" lIns="102870" tIns="0" rIns="102870" bIns="0" numCol="1" spcCol="1270" anchor="b" anchorCtr="0">
+          <a:noAutofit/>
+        </a:bodyPr>
+        <a:lstStyle/>
+        <a:p>
+          <a:pPr lvl="0" algn="l" defTabSz="1200150">
+            <a:lnSpc>
+              <a:spcPct val="90000"/>
+            </a:lnSpc>
+            <a:spcBef>
+              <a:spcPct val="0"/>
+            </a:spcBef>
+            <a:spcAft>
+              <a:spcPct val="35000"/>
+            </a:spcAft>
+          </a:pPr>
+          <a:r>
+            <a:rPr lang="en-US" sz="2700" kern="1200" dirty="0" smtClean="0"/>
+            <a:t>Floor increasing</a:t>
+          </a:r>
+          <a:endParaRPr lang="en-US" sz="2700" kern="1200" dirty="0"/>
+        </a:p>
+      </dsp:txBody>
+      <dsp:txXfrm>
+        <a:off x="4552646" y="5822431"/>
+        <a:ext cx="3831607" cy="405547"/>
+      </dsp:txXfrm>
+    </dsp:sp>
+    <dsp:sp modelId="{ABB45DD3-0DDF-48F4-9A4B-F9D10659BCA2}">
+      <dsp:nvSpPr>
+        <dsp:cNvPr id="0" name=""/>
+        <dsp:cNvSpPr/>
+      </dsp:nvSpPr>
+      <dsp:spPr>
+        <a:xfrm>
+          <a:off x="4552646" y="3772239"/>
+          <a:ext cx="3838228" cy="2465995"/>
+        </a:xfrm>
+        <a:prstGeom prst="rect">
+          <a:avLst/>
+        </a:prstGeom>
+        <a:noFill/>
+        <a:ln w="15875" cap="flat" cmpd="sng" algn="ctr">
+          <a:solidFill>
+            <a:schemeClr val="accent1">
+              <a:shade val="60000"/>
+              <a:hueOff val="0"/>
+              <a:satOff val="0"/>
+              <a:lumOff val="0"/>
+              <a:alphaOff val="0"/>
+            </a:schemeClr>
+          </a:solidFill>
+          <a:prstDash val="solid"/>
+        </a:ln>
+        <a:effectLst/>
+      </dsp:spPr>
+      <dsp:style>
+        <a:lnRef idx="2">
+          <a:scrgbClr r="0" g="0" b="0"/>
+        </a:lnRef>
+        <a:fillRef idx="0">
+          <a:scrgbClr r="0" g="0" b="0"/>
+        </a:fillRef>
+        <a:effectRef idx="0">
+          <a:scrgbClr r="0" g="0" b="0"/>
+        </a:effectRef>
+        <a:fontRef idx="minor"/>
+      </dsp:style>
+    </dsp:sp>
   </dsp:spTree>
 </dsp:drawing>
 </file>
@@ -6225,6 +7289,465 @@
       <dsp:cNvGrpSpPr/>
     </dsp:nvGrpSpPr>
     <dsp:grpSpPr/>
+    <dsp:sp modelId="{673D75F0-A42F-4594-9B4B-06E694C25586}">
+      <dsp:nvSpPr>
+        <dsp:cNvPr id="0" name=""/>
+        <dsp:cNvSpPr/>
+      </dsp:nvSpPr>
+      <dsp:spPr>
+        <a:xfrm>
+          <a:off x="2709256" y="3646661"/>
+          <a:ext cx="4039355" cy="2493471"/>
+        </a:xfrm>
+        <a:prstGeom prst="rect">
+          <a:avLst/>
+        </a:prstGeom>
+        <a:blipFill>
+          <a:blip xmlns:r="http://schemas.openxmlformats.org/officeDocument/2006/relationships" r:embed="rId1">
+            <a:extLst>
+              <a:ext uri="{28A0092B-C50C-407E-A947-70E740481C1C}">
+                <a14:useLocalDpi xmlns:a14="http://schemas.microsoft.com/office/drawing/2010/main" val="0"/>
+              </a:ext>
+            </a:extLst>
+          </a:blip>
+          <a:srcRect/>
+          <a:stretch>
+            <a:fillRect t="-1000" b="-1000"/>
+          </a:stretch>
+        </a:blipFill>
+        <a:ln w="15875" cap="flat" cmpd="sng" algn="ctr">
+          <a:solidFill>
+            <a:schemeClr val="lt1">
+              <a:hueOff val="0"/>
+              <a:satOff val="0"/>
+              <a:lumOff val="0"/>
+              <a:alphaOff val="0"/>
+            </a:schemeClr>
+          </a:solidFill>
+          <a:prstDash val="solid"/>
+        </a:ln>
+        <a:effectLst/>
+      </dsp:spPr>
+      <dsp:style>
+        <a:lnRef idx="2">
+          <a:scrgbClr r="0" g="0" b="0"/>
+        </a:lnRef>
+        <a:fillRef idx="1">
+          <a:scrgbClr r="0" g="0" b="0"/>
+        </a:fillRef>
+        <a:effectRef idx="0">
+          <a:scrgbClr r="0" g="0" b="0"/>
+        </a:effectRef>
+        <a:fontRef idx="minor"/>
+      </dsp:style>
+    </dsp:sp>
+    <dsp:sp modelId="{414E6D62-2E28-46B6-B7D4-4B8BBBE34C42}">
+      <dsp:nvSpPr>
+        <dsp:cNvPr id="0" name=""/>
+        <dsp:cNvSpPr/>
+      </dsp:nvSpPr>
+      <dsp:spPr>
+        <a:xfrm>
+          <a:off x="5103528" y="294997"/>
+          <a:ext cx="4039355" cy="2493471"/>
+        </a:xfrm>
+        <a:prstGeom prst="rect">
+          <a:avLst/>
+        </a:prstGeom>
+        <a:blipFill>
+          <a:blip xmlns:r="http://schemas.openxmlformats.org/officeDocument/2006/relationships" r:embed="rId2">
+            <a:extLst>
+              <a:ext uri="{28A0092B-C50C-407E-A947-70E740481C1C}">
+                <a14:useLocalDpi xmlns:a14="http://schemas.microsoft.com/office/drawing/2010/main" val="0"/>
+              </a:ext>
+            </a:extLst>
+          </a:blip>
+          <a:srcRect/>
+          <a:stretch>
+            <a:fillRect t="-5000" b="-5000"/>
+          </a:stretch>
+        </a:blipFill>
+        <a:ln w="15875" cap="flat" cmpd="sng" algn="ctr">
+          <a:solidFill>
+            <a:schemeClr val="lt1">
+              <a:hueOff val="0"/>
+              <a:satOff val="0"/>
+              <a:lumOff val="0"/>
+              <a:alphaOff val="0"/>
+            </a:schemeClr>
+          </a:solidFill>
+          <a:prstDash val="solid"/>
+        </a:ln>
+        <a:effectLst/>
+      </dsp:spPr>
+      <dsp:style>
+        <a:lnRef idx="2">
+          <a:scrgbClr r="0" g="0" b="0"/>
+        </a:lnRef>
+        <a:fillRef idx="1">
+          <a:scrgbClr r="0" g="0" b="0"/>
+        </a:fillRef>
+        <a:effectRef idx="0">
+          <a:scrgbClr r="0" g="0" b="0"/>
+        </a:effectRef>
+        <a:fontRef idx="minor"/>
+      </dsp:style>
+    </dsp:sp>
+    <dsp:sp modelId="{2618C4BE-B6E6-4DD4-8258-0A81CA05DF13}">
+      <dsp:nvSpPr>
+        <dsp:cNvPr id="0" name=""/>
+        <dsp:cNvSpPr/>
+      </dsp:nvSpPr>
+      <dsp:spPr>
+        <a:xfrm>
+          <a:off x="314983" y="294997"/>
+          <a:ext cx="4039355" cy="2493471"/>
+        </a:xfrm>
+        <a:prstGeom prst="rect">
+          <a:avLst/>
+        </a:prstGeom>
+        <a:blipFill>
+          <a:blip xmlns:r="http://schemas.openxmlformats.org/officeDocument/2006/relationships" r:embed="rId3">
+            <a:extLst>
+              <a:ext uri="{28A0092B-C50C-407E-A947-70E740481C1C}">
+                <a14:useLocalDpi xmlns:a14="http://schemas.microsoft.com/office/drawing/2010/main" val="0"/>
+              </a:ext>
+            </a:extLst>
+          </a:blip>
+          <a:srcRect/>
+          <a:stretch>
+            <a:fillRect t="-11000" b="-11000"/>
+          </a:stretch>
+        </a:blipFill>
+        <a:ln w="15875" cap="flat" cmpd="sng" algn="ctr">
+          <a:solidFill>
+            <a:schemeClr val="lt1">
+              <a:hueOff val="0"/>
+              <a:satOff val="0"/>
+              <a:lumOff val="0"/>
+              <a:alphaOff val="0"/>
+            </a:schemeClr>
+          </a:solidFill>
+          <a:prstDash val="solid"/>
+        </a:ln>
+        <a:effectLst/>
+      </dsp:spPr>
+      <dsp:style>
+        <a:lnRef idx="2">
+          <a:scrgbClr r="0" g="0" b="0"/>
+        </a:lnRef>
+        <a:fillRef idx="1">
+          <a:scrgbClr r="0" g="0" b="0"/>
+        </a:fillRef>
+        <a:effectRef idx="0">
+          <a:scrgbClr r="0" g="0" b="0"/>
+        </a:effectRef>
+        <a:fontRef idx="minor"/>
+      </dsp:style>
+    </dsp:sp>
+    <dsp:sp modelId="{4405F914-9D40-4FE8-A903-D126E72F12C7}">
+      <dsp:nvSpPr>
+        <dsp:cNvPr id="0" name=""/>
+        <dsp:cNvSpPr/>
+      </dsp:nvSpPr>
+      <dsp:spPr>
+        <a:xfrm>
+          <a:off x="1116" y="2773887"/>
+          <a:ext cx="4031084" cy="426660"/>
+        </a:xfrm>
+        <a:prstGeom prst="rect">
+          <a:avLst/>
+        </a:prstGeom>
+        <a:noFill/>
+        <a:ln>
+          <a:noFill/>
+        </a:ln>
+        <a:effectLst/>
+      </dsp:spPr>
+      <dsp:style>
+        <a:lnRef idx="0">
+          <a:scrgbClr r="0" g="0" b="0"/>
+        </a:lnRef>
+        <a:fillRef idx="0">
+          <a:scrgbClr r="0" g="0" b="0"/>
+        </a:fillRef>
+        <a:effectRef idx="0">
+          <a:scrgbClr r="0" g="0" b="0"/>
+        </a:effectRef>
+        <a:fontRef idx="minor"/>
+      </dsp:style>
+      <dsp:txBody>
+        <a:bodyPr spcFirstLastPara="0" vert="horz" wrap="square" lIns="80010" tIns="0" rIns="80010" bIns="0" numCol="1" spcCol="1270" anchor="b" anchorCtr="0">
+          <a:noAutofit/>
+        </a:bodyPr>
+        <a:lstStyle/>
+        <a:p>
+          <a:pPr lvl="0" algn="l" defTabSz="933450">
+            <a:lnSpc>
+              <a:spcPct val="90000"/>
+            </a:lnSpc>
+            <a:spcBef>
+              <a:spcPct val="0"/>
+            </a:spcBef>
+            <a:spcAft>
+              <a:spcPct val="35000"/>
+            </a:spcAft>
+          </a:pPr>
+          <a:r>
+            <a:rPr lang="en-US" sz="2100" kern="1200" dirty="0" smtClean="0"/>
+            <a:t>Less Variation in Processing Power </a:t>
+          </a:r>
+          <a:endParaRPr lang="en-US" sz="2100" kern="1200" dirty="0"/>
+        </a:p>
+      </dsp:txBody>
+      <dsp:txXfrm>
+        <a:off x="1116" y="2773887"/>
+        <a:ext cx="4031084" cy="426660"/>
+      </dsp:txXfrm>
+    </dsp:sp>
+    <dsp:sp modelId="{B94A3508-6EE1-4F84-BA2D-88D72D33E1F7}">
+      <dsp:nvSpPr>
+        <dsp:cNvPr id="0" name=""/>
+        <dsp:cNvSpPr/>
+      </dsp:nvSpPr>
+      <dsp:spPr>
+        <a:xfrm>
+          <a:off x="1116" y="616961"/>
+          <a:ext cx="4038049" cy="2594377"/>
+        </a:xfrm>
+        <a:prstGeom prst="rect">
+          <a:avLst/>
+        </a:prstGeom>
+        <a:noFill/>
+        <a:ln w="15875" cap="flat" cmpd="sng" algn="ctr">
+          <a:solidFill>
+            <a:schemeClr val="accent1">
+              <a:shade val="60000"/>
+              <a:hueOff val="0"/>
+              <a:satOff val="0"/>
+              <a:lumOff val="0"/>
+              <a:alphaOff val="0"/>
+            </a:schemeClr>
+          </a:solidFill>
+          <a:prstDash val="solid"/>
+        </a:ln>
+        <a:effectLst/>
+      </dsp:spPr>
+      <dsp:style>
+        <a:lnRef idx="2">
+          <a:scrgbClr r="0" g="0" b="0"/>
+        </a:lnRef>
+        <a:fillRef idx="0">
+          <a:scrgbClr r="0" g="0" b="0"/>
+        </a:fillRef>
+        <a:effectRef idx="0">
+          <a:scrgbClr r="0" g="0" b="0"/>
+        </a:effectRef>
+        <a:fontRef idx="minor"/>
+      </dsp:style>
+    </dsp:sp>
+    <dsp:sp modelId="{4E05E67A-E078-4AFB-B323-BC0480CC6FB7}">
+      <dsp:nvSpPr>
+        <dsp:cNvPr id="0" name=""/>
+        <dsp:cNvSpPr/>
+      </dsp:nvSpPr>
+      <dsp:spPr>
+        <a:xfrm>
+          <a:off x="4789661" y="2773887"/>
+          <a:ext cx="4031084" cy="426660"/>
+        </a:xfrm>
+        <a:prstGeom prst="rect">
+          <a:avLst/>
+        </a:prstGeom>
+        <a:noFill/>
+        <a:ln>
+          <a:noFill/>
+        </a:ln>
+        <a:effectLst/>
+      </dsp:spPr>
+      <dsp:style>
+        <a:lnRef idx="0">
+          <a:scrgbClr r="0" g="0" b="0"/>
+        </a:lnRef>
+        <a:fillRef idx="0">
+          <a:scrgbClr r="0" g="0" b="0"/>
+        </a:fillRef>
+        <a:effectRef idx="0">
+          <a:scrgbClr r="0" g="0" b="0"/>
+        </a:effectRef>
+        <a:fontRef idx="minor"/>
+      </dsp:style>
+      <dsp:txBody>
+        <a:bodyPr spcFirstLastPara="0" vert="horz" wrap="square" lIns="80010" tIns="0" rIns="80010" bIns="0" numCol="1" spcCol="1270" anchor="b" anchorCtr="0">
+          <a:noAutofit/>
+        </a:bodyPr>
+        <a:lstStyle/>
+        <a:p>
+          <a:pPr lvl="0" algn="l" defTabSz="933450">
+            <a:lnSpc>
+              <a:spcPct val="90000"/>
+            </a:lnSpc>
+            <a:spcBef>
+              <a:spcPct val="0"/>
+            </a:spcBef>
+            <a:spcAft>
+              <a:spcPct val="35000"/>
+            </a:spcAft>
+          </a:pPr>
+          <a:r>
+            <a:rPr lang="en-US" sz="2100" kern="1200" dirty="0" smtClean="0"/>
+            <a:t>More Variation in Processing Power </a:t>
+          </a:r>
+          <a:endParaRPr lang="en-US" sz="2100" kern="1200" dirty="0"/>
+        </a:p>
+      </dsp:txBody>
+      <dsp:txXfrm>
+        <a:off x="4789661" y="2773887"/>
+        <a:ext cx="4031084" cy="426660"/>
+      </dsp:txXfrm>
+    </dsp:sp>
+    <dsp:sp modelId="{B1A6DB5A-3DA5-4A52-94AB-ACCD48881AEB}">
+      <dsp:nvSpPr>
+        <dsp:cNvPr id="0" name=""/>
+        <dsp:cNvSpPr/>
+      </dsp:nvSpPr>
+      <dsp:spPr>
+        <a:xfrm>
+          <a:off x="4789661" y="616961"/>
+          <a:ext cx="4038049" cy="2594377"/>
+        </a:xfrm>
+        <a:prstGeom prst="rect">
+          <a:avLst/>
+        </a:prstGeom>
+        <a:noFill/>
+        <a:ln w="15875" cap="flat" cmpd="sng" algn="ctr">
+          <a:solidFill>
+            <a:schemeClr val="accent1">
+              <a:shade val="60000"/>
+              <a:hueOff val="0"/>
+              <a:satOff val="0"/>
+              <a:lumOff val="0"/>
+              <a:alphaOff val="0"/>
+            </a:schemeClr>
+          </a:solidFill>
+          <a:prstDash val="solid"/>
+        </a:ln>
+        <a:effectLst/>
+      </dsp:spPr>
+      <dsp:style>
+        <a:lnRef idx="2">
+          <a:scrgbClr r="0" g="0" b="0"/>
+        </a:lnRef>
+        <a:fillRef idx="0">
+          <a:scrgbClr r="0" g="0" b="0"/>
+        </a:fillRef>
+        <a:effectRef idx="0">
+          <a:scrgbClr r="0" g="0" b="0"/>
+        </a:effectRef>
+        <a:fontRef idx="minor"/>
+      </dsp:style>
+    </dsp:sp>
+    <dsp:sp modelId="{B96A84FB-0136-489A-A1AF-B53F1D122976}">
+      <dsp:nvSpPr>
+        <dsp:cNvPr id="0" name=""/>
+        <dsp:cNvSpPr/>
+      </dsp:nvSpPr>
+      <dsp:spPr>
+        <a:xfrm>
+          <a:off x="2395388" y="6125551"/>
+          <a:ext cx="4031084" cy="426660"/>
+        </a:xfrm>
+        <a:prstGeom prst="rect">
+          <a:avLst/>
+        </a:prstGeom>
+        <a:noFill/>
+        <a:ln>
+          <a:noFill/>
+        </a:ln>
+        <a:effectLst/>
+      </dsp:spPr>
+      <dsp:style>
+        <a:lnRef idx="0">
+          <a:scrgbClr r="0" g="0" b="0"/>
+        </a:lnRef>
+        <a:fillRef idx="0">
+          <a:scrgbClr r="0" g="0" b="0"/>
+        </a:fillRef>
+        <a:effectRef idx="0">
+          <a:scrgbClr r="0" g="0" b="0"/>
+        </a:effectRef>
+        <a:fontRef idx="minor"/>
+      </dsp:style>
+      <dsp:txBody>
+        <a:bodyPr spcFirstLastPara="0" vert="horz" wrap="square" lIns="80010" tIns="0" rIns="80010" bIns="0" numCol="1" spcCol="1270" anchor="b" anchorCtr="0">
+          <a:noAutofit/>
+        </a:bodyPr>
+        <a:lstStyle/>
+        <a:p>
+          <a:pPr lvl="0" algn="l" defTabSz="933450">
+            <a:lnSpc>
+              <a:spcPct val="90000"/>
+            </a:lnSpc>
+            <a:spcBef>
+              <a:spcPct val="0"/>
+            </a:spcBef>
+            <a:spcAft>
+              <a:spcPct val="35000"/>
+            </a:spcAft>
+          </a:pPr>
+          <a:r>
+            <a:rPr lang="en-US" sz="2100" kern="1200" dirty="0" smtClean="0"/>
+            <a:t>Default</a:t>
+          </a:r>
+          <a:endParaRPr lang="en-US" sz="2100" kern="1200" dirty="0"/>
+        </a:p>
+      </dsp:txBody>
+      <dsp:txXfrm>
+        <a:off x="2395388" y="6125551"/>
+        <a:ext cx="4031084" cy="426660"/>
+      </dsp:txXfrm>
+    </dsp:sp>
+    <dsp:sp modelId="{A925C7AA-2651-492D-8EC9-97881AAC5AD4}">
+      <dsp:nvSpPr>
+        <dsp:cNvPr id="0" name=""/>
+        <dsp:cNvSpPr/>
+      </dsp:nvSpPr>
+      <dsp:spPr>
+        <a:xfrm>
+          <a:off x="2395388" y="3968625"/>
+          <a:ext cx="4038049" cy="2594377"/>
+        </a:xfrm>
+        <a:prstGeom prst="rect">
+          <a:avLst/>
+        </a:prstGeom>
+        <a:noFill/>
+        <a:ln w="15875" cap="flat" cmpd="sng" algn="ctr">
+          <a:solidFill>
+            <a:schemeClr val="accent1">
+              <a:shade val="60000"/>
+              <a:hueOff val="0"/>
+              <a:satOff val="0"/>
+              <a:lumOff val="0"/>
+              <a:alphaOff val="0"/>
+            </a:schemeClr>
+          </a:solidFill>
+          <a:prstDash val="solid"/>
+        </a:ln>
+        <a:effectLst/>
+      </dsp:spPr>
+      <dsp:style>
+        <a:lnRef idx="2">
+          <a:scrgbClr r="0" g="0" b="0"/>
+        </a:lnRef>
+        <a:fillRef idx="0">
+          <a:scrgbClr r="0" g="0" b="0"/>
+        </a:fillRef>
+        <a:effectRef idx="0">
+          <a:scrgbClr r="0" g="0" b="0"/>
+        </a:effectRef>
+        <a:fontRef idx="minor"/>
+      </dsp:style>
+    </dsp:sp>
   </dsp:spTree>
 </dsp:drawing>
 </file>
@@ -12558,7 +14081,7 @@
           <a:p>
             <a:fld id="{84D7EA87-734C-421E-8BDE-AAC0B0E904A6}" type="datetimeFigureOut">
               <a:rPr lang="en-US" smtClean="0"/>
-              <a:t>5/1/2014</a:t>
+              <a:t>5/4/2014</a:t>
             </a:fld>
             <a:endParaRPr lang="en-US" dirty="0"/>
           </a:p>
@@ -13253,8 +14776,9 @@
           <a:p>
             <a:r>
               <a:rPr lang="en-US" dirty="0" smtClean="0"/>
-              <a:t>-Sam</a:t>
+              <a:t>In-Sam</a:t>
             </a:r>
+            <a:endParaRPr lang="en-US" dirty="0" smtClean="0"/>
           </a:p>
           <a:p>
             <a:endParaRPr lang="en-US" dirty="0" smtClean="0"/>
@@ -13286,7 +14810,11 @@
             </a:pPr>
             <a:r>
               <a:rPr lang="en-US" baseline="0" dirty="0" smtClean="0"/>
-              <a:t>Red =20</a:t>
+              <a:t>Green </a:t>
+            </a:r>
+            <a:r>
+              <a:rPr lang="en-US" baseline="0" dirty="0" smtClean="0"/>
+              <a:t>=20</a:t>
             </a:r>
           </a:p>
           <a:p>
@@ -13296,8 +14824,9 @@
             </a:pPr>
             <a:r>
               <a:rPr lang="en-US" baseline="0" dirty="0" smtClean="0"/>
-              <a:t>Green =25</a:t>
+              <a:t>Red=25</a:t>
             </a:r>
+            <a:endParaRPr lang="en-US" baseline="0" dirty="0" smtClean="0"/>
           </a:p>
           <a:p>
             <a:pPr marL="0" indent="0">
@@ -19363,7 +20892,7 @@
           <a:p>
             <a:fld id="{48A87A34-81AB-432B-8DAE-1953F412C126}" type="datetimeFigureOut">
               <a:rPr lang="en-US" smtClean="0"/>
-              <a:t>5/1/2014</a:t>
+              <a:t>5/4/2014</a:t>
             </a:fld>
             <a:endParaRPr lang="en-US" dirty="0"/>
           </a:p>
@@ -19630,7 +21159,7 @@
           <a:p>
             <a:fld id="{48A87A34-81AB-432B-8DAE-1953F412C126}" type="datetimeFigureOut">
               <a:rPr lang="en-US" smtClean="0"/>
-              <a:t>5/1/2014</a:t>
+              <a:t>5/4/2014</a:t>
             </a:fld>
             <a:endParaRPr lang="en-US" dirty="0"/>
           </a:p>
@@ -19826,7 +21355,7 @@
           <a:p>
             <a:fld id="{48A87A34-81AB-432B-8DAE-1953F412C126}" type="datetimeFigureOut">
               <a:rPr lang="en-US" smtClean="0"/>
-              <a:t>5/1/2014</a:t>
+              <a:t>5/4/2014</a:t>
             </a:fld>
             <a:endParaRPr lang="en-US" dirty="0"/>
           </a:p>
@@ -20089,7 +21618,7 @@
           <a:p>
             <a:fld id="{48A87A34-81AB-432B-8DAE-1953F412C126}" type="datetimeFigureOut">
               <a:rPr lang="en-US" smtClean="0"/>
-              <a:t>5/1/2014</a:t>
+              <a:t>5/4/2014</a:t>
             </a:fld>
             <a:endParaRPr lang="en-US" dirty="0"/>
           </a:p>
@@ -20523,7 +22052,7 @@
           <a:p>
             <a:fld id="{48A87A34-81AB-432B-8DAE-1953F412C126}" type="datetimeFigureOut">
               <a:rPr lang="en-US" smtClean="0"/>
-              <a:t>5/1/2014</a:t>
+              <a:t>5/4/2014</a:t>
             </a:fld>
             <a:endParaRPr lang="en-US" dirty="0"/>
           </a:p>
@@ -21069,7 +22598,7 @@
           <a:p>
             <a:fld id="{48A87A34-81AB-432B-8DAE-1953F412C126}" type="datetimeFigureOut">
               <a:rPr lang="en-US" smtClean="0"/>
-              <a:t>5/1/2014</a:t>
+              <a:t>5/4/2014</a:t>
             </a:fld>
             <a:endParaRPr lang="en-US" dirty="0"/>
           </a:p>
@@ -21789,7 +23318,7 @@
           <a:p>
             <a:fld id="{48A87A34-81AB-432B-8DAE-1953F412C126}" type="datetimeFigureOut">
               <a:rPr lang="en-US" smtClean="0"/>
-              <a:t>5/1/2014</a:t>
+              <a:t>5/4/2014</a:t>
             </a:fld>
             <a:endParaRPr lang="en-US" dirty="0"/>
           </a:p>
@@ -21963,7 +23492,7 @@
           <a:p>
             <a:fld id="{48A87A34-81AB-432B-8DAE-1953F412C126}" type="datetimeFigureOut">
               <a:rPr lang="en-US" smtClean="0"/>
-              <a:t>5/1/2014</a:t>
+              <a:t>5/4/2014</a:t>
             </a:fld>
             <a:endParaRPr lang="en-US" dirty="0"/>
           </a:p>
@@ -22143,7 +23672,7 @@
           <a:p>
             <a:fld id="{48A87A34-81AB-432B-8DAE-1953F412C126}" type="datetimeFigureOut">
               <a:rPr lang="en-US" smtClean="0"/>
-              <a:t>5/1/2014</a:t>
+              <a:t>5/4/2014</a:t>
             </a:fld>
             <a:endParaRPr lang="en-US" dirty="0"/>
           </a:p>
@@ -22328,7 +23857,7 @@
           <a:p>
             <a:fld id="{48A87A34-81AB-432B-8DAE-1953F412C126}" type="datetimeFigureOut">
               <a:rPr lang="en-US" smtClean="0"/>
-              <a:t>5/1/2014</a:t>
+              <a:t>5/4/2014</a:t>
             </a:fld>
             <a:endParaRPr lang="en-US" dirty="0"/>
           </a:p>
@@ -22588,7 +24117,7 @@
           <a:p>
             <a:fld id="{48A87A34-81AB-432B-8DAE-1953F412C126}" type="datetimeFigureOut">
               <a:rPr lang="en-US" smtClean="0"/>
-              <a:t>5/1/2014</a:t>
+              <a:t>5/4/2014</a:t>
             </a:fld>
             <a:endParaRPr lang="en-US" dirty="0"/>
           </a:p>
@@ -22820,7 +24349,7 @@
           <a:p>
             <a:fld id="{48A87A34-81AB-432B-8DAE-1953F412C126}" type="datetimeFigureOut">
               <a:rPr lang="en-US" smtClean="0"/>
-              <a:t>5/1/2014</a:t>
+              <a:t>5/4/2014</a:t>
             </a:fld>
             <a:endParaRPr lang="en-US" dirty="0"/>
           </a:p>
@@ -23201,7 +24730,7 @@
           <a:p>
             <a:fld id="{48A87A34-81AB-432B-8DAE-1953F412C126}" type="datetimeFigureOut">
               <a:rPr lang="en-US" smtClean="0"/>
-              <a:t>5/1/2014</a:t>
+              <a:t>5/4/2014</a:t>
             </a:fld>
             <a:endParaRPr lang="en-US" dirty="0"/>
           </a:p>
@@ -23319,7 +24848,7 @@
           <a:p>
             <a:fld id="{48A87A34-81AB-432B-8DAE-1953F412C126}" type="datetimeFigureOut">
               <a:rPr lang="en-US" smtClean="0"/>
-              <a:t>5/1/2014</a:t>
+              <a:t>5/4/2014</a:t>
             </a:fld>
             <a:endParaRPr lang="en-US" dirty="0"/>
           </a:p>
@@ -23414,7 +24943,7 @@
           <a:p>
             <a:fld id="{48A87A34-81AB-432B-8DAE-1953F412C126}" type="datetimeFigureOut">
               <a:rPr lang="en-US" smtClean="0"/>
-              <a:t>5/1/2014</a:t>
+              <a:t>5/4/2014</a:t>
             </a:fld>
             <a:endParaRPr lang="en-US" dirty="0"/>
           </a:p>
@@ -23663,7 +25192,7 @@
           <a:p>
             <a:fld id="{48A87A34-81AB-432B-8DAE-1953F412C126}" type="datetimeFigureOut">
               <a:rPr lang="en-US" smtClean="0"/>
-              <a:t>5/1/2014</a:t>
+              <a:t>5/4/2014</a:t>
             </a:fld>
             <a:endParaRPr lang="en-US" dirty="0"/>
           </a:p>
@@ -23915,7 +25444,7 @@
           <a:p>
             <a:fld id="{48A87A34-81AB-432B-8DAE-1953F412C126}" type="datetimeFigureOut">
               <a:rPr lang="en-US" smtClean="0"/>
-              <a:t>5/1/2014</a:t>
+              <a:t>5/4/2014</a:t>
             </a:fld>
             <a:endParaRPr lang="en-US" dirty="0"/>
           </a:p>
@@ -26983,7 +28512,7 @@
             <a:fld id="{48A87A34-81AB-432B-8DAE-1953F412C126}" type="datetimeFigureOut">
               <a:rPr lang="en-US" smtClean="0"/>
               <a:pPr/>
-              <a:t>5/1/2014</a:t>
+              <a:t>5/4/2014</a:t>
             </a:fld>
             <a:endParaRPr lang="en-US" dirty="0"/>
           </a:p>
@@ -27388,7 +28917,7 @@
 </file>
 
 <file path=ppt/slides/slide1.xml><?xml version="1.0" encoding="utf-8"?>
-<p:sld xmlns:a="http://schemas.openxmlformats.org/drawingml/2006/main" xmlns:r="http://schemas.openxmlformats.org/officeDocument/2006/relationships" xmlns:p="http://schemas.openxmlformats.org/presentationml/2006/main">
+<p:sld xmlns:a="http://schemas.openxmlformats.org/drawingml/2006/main" xmlns:r="http://schemas.openxmlformats.org/officeDocument/2006/relationships" xmlns:p="http://schemas.openxmlformats.org/presentationml/2006/main" show="0">
   <p:cSld>
     <p:spTree>
       <p:nvGrpSpPr>
@@ -27517,6 +29046,14 @@
   <p:clrMapOvr>
     <a:masterClrMapping/>
   </p:clrMapOvr>
+  <mc:AlternateContent xmlns:mc="http://schemas.openxmlformats.org/markup-compatibility/2006">
+    <mc:Choice xmlns:p14="http://schemas.microsoft.com/office/powerpoint/2010/main" Requires="p14">
+      <p:transition spd="slow" p14:dur="2000"/>
+    </mc:Choice>
+    <mc:Fallback>
+      <p:transition spd="slow"/>
+    </mc:Fallback>
+  </mc:AlternateContent>
   <p:timing>
     <p:tnLst>
       <p:par>
@@ -27684,7 +29221,7 @@
 </file>
 
 <file path=ppt/slides/slide12.xml><?xml version="1.0" encoding="utf-8"?>
-<p:sld xmlns:a="http://schemas.openxmlformats.org/drawingml/2006/main" xmlns:r="http://schemas.openxmlformats.org/officeDocument/2006/relationships" xmlns:p="http://schemas.openxmlformats.org/presentationml/2006/main">
+<p:sld xmlns:a="http://schemas.openxmlformats.org/drawingml/2006/main" xmlns:r="http://schemas.openxmlformats.org/officeDocument/2006/relationships" xmlns:p="http://schemas.openxmlformats.org/presentationml/2006/main" show="0">
   <p:cSld>
     <p:spTree>
       <p:nvGrpSpPr>
@@ -27735,6 +29272,14 @@
   <p:clrMapOvr>
     <a:masterClrMapping/>
   </p:clrMapOvr>
+  <mc:AlternateContent xmlns:mc="http://schemas.openxmlformats.org/markup-compatibility/2006">
+    <mc:Choice xmlns:p14="http://schemas.microsoft.com/office/powerpoint/2010/main" Requires="p14">
+      <p:transition spd="slow" p14:dur="2000"/>
+    </mc:Choice>
+    <mc:Fallback>
+      <p:transition spd="slow"/>
+    </mc:Fallback>
+  </mc:AlternateContent>
   <p:timing>
     <p:tnLst>
       <p:par>
@@ -27772,14 +29317,14 @@
             <p:ph idx="1"/>
             <p:extLst>
               <p:ext uri="{D42A27DB-BD31-4B8C-83A1-F6EECF244321}">
-                <p14:modId xmlns:p14="http://schemas.microsoft.com/office/powerpoint/2010/main" val="2202892064"/>
+                <p14:modId xmlns:p14="http://schemas.microsoft.com/office/powerpoint/2010/main" val="3666861340"/>
               </p:ext>
             </p:extLst>
           </p:nvPr>
         </p:nvGraphicFramePr>
         <p:xfrm>
-          <a:off x="226243" y="169682"/>
-          <a:ext cx="8691513" cy="6518635"/>
+          <a:off x="1" y="1"/>
+          <a:ext cx="9144000" cy="6858000"/>
         </p:xfrm>
         <a:graphic>
           <a:graphicData uri="http://schemas.openxmlformats.org/drawingml/2006/diagram">
@@ -27808,7 +29353,7 @@
 </file>
 
 <file path=ppt/slides/slide2.xml><?xml version="1.0" encoding="utf-8"?>
-<p:sld xmlns:a="http://schemas.openxmlformats.org/drawingml/2006/main" xmlns:r="http://schemas.openxmlformats.org/officeDocument/2006/relationships" xmlns:p="http://schemas.openxmlformats.org/presentationml/2006/main">
+<p:sld xmlns:a="http://schemas.openxmlformats.org/drawingml/2006/main" xmlns:r="http://schemas.openxmlformats.org/officeDocument/2006/relationships" xmlns:p="http://schemas.openxmlformats.org/presentationml/2006/main" show="0">
   <p:cSld>
     <p:spTree>
       <p:nvGrpSpPr>
@@ -27983,6 +29528,14 @@
   <p:clrMapOvr>
     <a:masterClrMapping/>
   </p:clrMapOvr>
+  <mc:AlternateContent xmlns:mc="http://schemas.openxmlformats.org/markup-compatibility/2006">
+    <mc:Choice xmlns:p14="http://schemas.microsoft.com/office/powerpoint/2010/main" Requires="p14">
+      <p:transition spd="slow" p14:dur="2000"/>
+    </mc:Choice>
+    <mc:Fallback>
+      <p:transition spd="slow"/>
+    </mc:Fallback>
+  </mc:AlternateContent>
   <p:timing>
     <p:tnLst>
       <p:par>
@@ -27994,7 +29547,7 @@
 </file>
 
 <file path=ppt/slides/slide3.xml><?xml version="1.0" encoding="utf-8"?>
-<p:sld xmlns:a="http://schemas.openxmlformats.org/drawingml/2006/main" xmlns:r="http://schemas.openxmlformats.org/officeDocument/2006/relationships" xmlns:p="http://schemas.openxmlformats.org/presentationml/2006/main">
+<p:sld xmlns:a="http://schemas.openxmlformats.org/drawingml/2006/main" xmlns:r="http://schemas.openxmlformats.org/officeDocument/2006/relationships" xmlns:p="http://schemas.openxmlformats.org/presentationml/2006/main" show="0">
   <p:cSld>
     <p:spTree>
       <p:nvGrpSpPr>
@@ -28589,6 +30142,14 @@
   <p:clrMapOvr>
     <a:masterClrMapping/>
   </p:clrMapOvr>
+  <mc:AlternateContent xmlns:mc="http://schemas.openxmlformats.org/markup-compatibility/2006">
+    <mc:Choice xmlns:p14="http://schemas.microsoft.com/office/powerpoint/2010/main" Requires="p14">
+      <p:transition spd="slow" p14:dur="2000"/>
+    </mc:Choice>
+    <mc:Fallback>
+      <p:transition spd="slow"/>
+    </mc:Fallback>
+  </mc:AlternateContent>
   <p:timing>
     <p:tnLst>
       <p:par>
@@ -28600,7 +30161,7 @@
 </file>
 
 <file path=ppt/slides/slide4.xml><?xml version="1.0" encoding="utf-8"?>
-<p:sld xmlns:a="http://schemas.openxmlformats.org/drawingml/2006/main" xmlns:r="http://schemas.openxmlformats.org/officeDocument/2006/relationships" xmlns:p="http://schemas.openxmlformats.org/presentationml/2006/main">
+<p:sld xmlns:a="http://schemas.openxmlformats.org/drawingml/2006/main" xmlns:r="http://schemas.openxmlformats.org/officeDocument/2006/relationships" xmlns:p="http://schemas.openxmlformats.org/presentationml/2006/main" show="0">
   <p:cSld>
     <p:spTree>
       <p:nvGrpSpPr>
@@ -29092,6 +30653,14 @@
   <p:clrMapOvr>
     <a:masterClrMapping/>
   </p:clrMapOvr>
+  <mc:AlternateContent xmlns:mc="http://schemas.openxmlformats.org/markup-compatibility/2006">
+    <mc:Choice xmlns:p14="http://schemas.microsoft.com/office/powerpoint/2010/main" Requires="p14">
+      <p:transition spd="slow" p14:dur="2000"/>
+    </mc:Choice>
+    <mc:Fallback>
+      <p:transition spd="slow"/>
+    </mc:Fallback>
+  </mc:AlternateContent>
   <p:timing>
     <p:tnLst>
       <p:par>
@@ -29103,7 +30672,7 @@
 </file>
 
 <file path=ppt/slides/slide5.xml><?xml version="1.0" encoding="utf-8"?>
-<p:sld xmlns:a="http://schemas.openxmlformats.org/drawingml/2006/main" xmlns:r="http://schemas.openxmlformats.org/officeDocument/2006/relationships" xmlns:p="http://schemas.openxmlformats.org/presentationml/2006/main">
+<p:sld xmlns:a="http://schemas.openxmlformats.org/drawingml/2006/main" xmlns:r="http://schemas.openxmlformats.org/officeDocument/2006/relationships" xmlns:p="http://schemas.openxmlformats.org/presentationml/2006/main" show="0">
   <p:cSld>
     <p:spTree>
       <p:nvGrpSpPr>
@@ -29284,6 +30853,14 @@
   <p:clrMapOvr>
     <a:masterClrMapping/>
   </p:clrMapOvr>
+  <mc:AlternateContent xmlns:mc="http://schemas.openxmlformats.org/markup-compatibility/2006">
+    <mc:Choice xmlns:p14="http://schemas.microsoft.com/office/powerpoint/2010/main" Requires="p14">
+      <p:transition spd="slow" p14:dur="2000"/>
+    </mc:Choice>
+    <mc:Fallback>
+      <p:transition spd="slow"/>
+    </mc:Fallback>
+  </mc:AlternateContent>
   <p:timing>
     <p:tnLst>
       <p:par>
@@ -29295,7 +30872,7 @@
 </file>
 
 <file path=ppt/slides/slide6.xml><?xml version="1.0" encoding="utf-8"?>
-<p:sld xmlns:a="http://schemas.openxmlformats.org/drawingml/2006/main" xmlns:r="http://schemas.openxmlformats.org/officeDocument/2006/relationships" xmlns:p="http://schemas.openxmlformats.org/presentationml/2006/main">
+<p:sld xmlns:a="http://schemas.openxmlformats.org/drawingml/2006/main" xmlns:r="http://schemas.openxmlformats.org/officeDocument/2006/relationships" xmlns:p="http://schemas.openxmlformats.org/presentationml/2006/main" show="0">
   <p:cSld>
     <p:spTree>
       <p:nvGrpSpPr>
@@ -29552,6 +31129,14 @@
   <p:clrMapOvr>
     <a:masterClrMapping/>
   </p:clrMapOvr>
+  <mc:AlternateContent xmlns:mc="http://schemas.openxmlformats.org/markup-compatibility/2006">
+    <mc:Choice xmlns:p14="http://schemas.microsoft.com/office/powerpoint/2010/main" Requires="p14">
+      <p:transition spd="slow" p14:dur="2000"/>
+    </mc:Choice>
+    <mc:Fallback>
+      <p:transition spd="slow"/>
+    </mc:Fallback>
+  </mc:AlternateContent>
   <p:timing>
     <p:tnLst>
       <p:par>
@@ -29563,7 +31148,7 @@
 </file>
 
 <file path=ppt/slides/slide7.xml><?xml version="1.0" encoding="utf-8"?>
-<p:sld xmlns:a="http://schemas.openxmlformats.org/drawingml/2006/main" xmlns:r="http://schemas.openxmlformats.org/officeDocument/2006/relationships" xmlns:p="http://schemas.openxmlformats.org/presentationml/2006/main">
+<p:sld xmlns:a="http://schemas.openxmlformats.org/drawingml/2006/main" xmlns:r="http://schemas.openxmlformats.org/officeDocument/2006/relationships" xmlns:p="http://schemas.openxmlformats.org/presentationml/2006/main" show="0">
   <p:cSld>
     <p:spTree>
       <p:nvGrpSpPr>
@@ -29602,8 +31187,8 @@
           </a:p>
         </p:txBody>
       </p:sp>
-      <mc:AlternateContent xmlns:mc="http://schemas.openxmlformats.org/markup-compatibility/2006" xmlns:a14="http://schemas.microsoft.com/office/drawing/2010/main">
-        <mc:Choice Requires="a14">
+      <mc:AlternateContent xmlns:mc="http://schemas.openxmlformats.org/markup-compatibility/2006">
+        <mc:Choice xmlns:a14="http://schemas.microsoft.com/office/drawing/2010/main" Requires="a14">
           <p:sp>
             <p:nvSpPr>
               <p:cNvPr id="3" name="Content Placeholder 2"/>
@@ -29873,7 +31458,7 @@
                             <a:rPr lang="en-US" b="0" i="1" smtClean="0">
                               <a:latin typeface="Cambria Math" panose="02040503050406030204" pitchFamily="18" charset="0"/>
                             </a:rPr>
-                            <m:t>𝑗</m:t>
+                            <m:t>𝑚</m:t>
                           </m:r>
                         </m:sub>
                       </m:sSub>
@@ -30358,7 +31943,7 @@
             </p:txBody>
           </p:sp>
         </mc:Choice>
-        <mc:Fallback xmlns="">
+        <mc:Fallback>
           <p:sp>
             <p:nvSpPr>
               <p:cNvPr id="3" name="Content Placeholder 2"/>
@@ -30402,6 +31987,14 @@
   <p:clrMapOvr>
     <a:masterClrMapping/>
   </p:clrMapOvr>
+  <mc:AlternateContent xmlns:mc="http://schemas.openxmlformats.org/markup-compatibility/2006">
+    <mc:Choice xmlns:p14="http://schemas.microsoft.com/office/powerpoint/2010/main" Requires="p14">
+      <p:transition spd="slow" p14:dur="2000"/>
+    </mc:Choice>
+    <mc:Fallback>
+      <p:transition spd="slow"/>
+    </mc:Fallback>
+  </mc:AlternateContent>
   <p:timing>
     <p:tnLst>
       <p:par>
@@ -30413,7 +32006,7 @@
 </file>
 
 <file path=ppt/slides/slide8.xml><?xml version="1.0" encoding="utf-8"?>
-<p:sld xmlns:a="http://schemas.openxmlformats.org/drawingml/2006/main" xmlns:r="http://schemas.openxmlformats.org/officeDocument/2006/relationships" xmlns:p="http://schemas.openxmlformats.org/presentationml/2006/main">
+<p:sld xmlns:a="http://schemas.openxmlformats.org/drawingml/2006/main" xmlns:r="http://schemas.openxmlformats.org/officeDocument/2006/relationships" xmlns:p="http://schemas.openxmlformats.org/presentationml/2006/main" show="0">
   <p:cSld>
     <p:spTree>
       <p:nvGrpSpPr>
@@ -30487,6 +32080,14 @@
   <p:clrMapOvr>
     <a:masterClrMapping/>
   </p:clrMapOvr>
+  <mc:AlternateContent xmlns:mc="http://schemas.openxmlformats.org/markup-compatibility/2006">
+    <mc:Choice xmlns:p14="http://schemas.microsoft.com/office/powerpoint/2010/main" Requires="p14">
+      <p:transition spd="slow" p14:dur="2000"/>
+    </mc:Choice>
+    <mc:Fallback>
+      <p:transition spd="slow"/>
+    </mc:Fallback>
+  </mc:AlternateContent>
   <p:timing>
     <p:tnLst>
       <p:par>

</xml_diff>